<commit_message>
Added pdf of academic poster for Northern California Computational Biology Symposium 2017 (NCCB)
</commit_message>
<xml_diff>
--- a/Boutros_DataSonification_1.pptx
+++ b/Boutros_DataSonification_1.pptx
@@ -5325,7 +5325,7 @@
               <a:graphicData uri="http://schemas.openxmlformats.org/presentationml/2006/ole">
                 <mc:AlternateContent xmlns:mc="http://schemas.openxmlformats.org/markup-compatibility/2006">
                   <mc:Choice xmlns:v="urn:schemas-microsoft-com:vml" Requires="v">
-                    <p:oleObj spid="_x0000_s1290" name="Image" r:id="rId8" imgW="1828440" imgH="1117440" progId="Photoshop.Image.13">
+                    <p:oleObj spid="_x0000_s1354" name="Image" r:id="rId8" imgW="1828440" imgH="1117440" progId="Photoshop.Image.13">
                       <p:embed/>
                     </p:oleObj>
                   </mc:Choice>
@@ -5382,7 +5382,7 @@
               <a:graphicData uri="http://schemas.openxmlformats.org/presentationml/2006/ole">
                 <mc:AlternateContent xmlns:mc="http://schemas.openxmlformats.org/markup-compatibility/2006">
                   <mc:Choice xmlns:v="urn:schemas-microsoft-com:vml" Requires="v">
-                    <p:oleObj spid="_x0000_s1291" name="Image" r:id="rId10" imgW="1828440" imgH="1117440" progId="Photoshop.Image.13">
+                    <p:oleObj spid="_x0000_s1355" name="Image" r:id="rId10" imgW="1828440" imgH="1117440" progId="Photoshop.Image.13">
                       <p:embed/>
                     </p:oleObj>
                   </mc:Choice>
@@ -6505,7 +6505,7 @@
             <a:graphicData uri="http://schemas.openxmlformats.org/presentationml/2006/ole">
               <mc:AlternateContent xmlns:mc="http://schemas.openxmlformats.org/markup-compatibility/2006">
                 <mc:Choice xmlns:v="urn:schemas-microsoft-com:vml" Requires="v">
-                  <p:oleObj spid="_x0000_s1292" name="Image" r:id="rId12" imgW="4571280" imgH="1688760" progId="Photoshop.Image.13">
+                  <p:oleObj spid="_x0000_s1356" name="Image" r:id="rId12" imgW="4571280" imgH="1688760" progId="Photoshop.Image.13">
                     <p:embed/>
                   </p:oleObj>
                 </mc:Choice>
@@ -6589,7 +6589,7 @@
             <a:graphicData uri="http://schemas.openxmlformats.org/presentationml/2006/ole">
               <mc:AlternateContent xmlns:mc="http://schemas.openxmlformats.org/markup-compatibility/2006">
                 <mc:Choice xmlns:v="urn:schemas-microsoft-com:vml" Requires="v">
-                  <p:oleObj spid="_x0000_s1293" name="Image" r:id="rId15" imgW="1574280" imgH="1053720" progId="Photoshop.Image.13">
+                  <p:oleObj spid="_x0000_s1357" name="Image" r:id="rId15" imgW="1574280" imgH="1053720" progId="Photoshop.Image.13">
                     <p:embed/>
                   </p:oleObj>
                 </mc:Choice>
@@ -8571,7 +8571,7 @@
             <a:graphicData uri="http://schemas.openxmlformats.org/presentationml/2006/ole">
               <mc:AlternateContent xmlns:mc="http://schemas.openxmlformats.org/markup-compatibility/2006">
                 <mc:Choice xmlns:v="urn:schemas-microsoft-com:vml" Requires="v">
-                  <p:oleObj spid="_x0000_s2314" name="Image" r:id="rId4" imgW="4571280" imgH="1688760" progId="Photoshop.Image.13">
+                  <p:oleObj spid="_x0000_s2378" name="Image" r:id="rId4" imgW="4571280" imgH="1688760" progId="Photoshop.Image.13">
                     <p:embed/>
                   </p:oleObj>
                 </mc:Choice>
@@ -8655,7 +8655,7 @@
             <a:graphicData uri="http://schemas.openxmlformats.org/presentationml/2006/ole">
               <mc:AlternateContent xmlns:mc="http://schemas.openxmlformats.org/markup-compatibility/2006">
                 <mc:Choice xmlns:v="urn:schemas-microsoft-com:vml" Requires="v">
-                  <p:oleObj spid="_x0000_s2315" name="Image" r:id="rId7" imgW="1574280" imgH="1053720" progId="Photoshop.Image.13">
+                  <p:oleObj spid="_x0000_s2379" name="Image" r:id="rId7" imgW="1574280" imgH="1053720" progId="Photoshop.Image.13">
                     <p:embed/>
                   </p:oleObj>
                 </mc:Choice>
@@ -10164,7 +10164,7 @@
               <a:graphicData uri="http://schemas.openxmlformats.org/presentationml/2006/ole">
                 <mc:AlternateContent xmlns:mc="http://schemas.openxmlformats.org/markup-compatibility/2006">
                   <mc:Choice xmlns:v="urn:schemas-microsoft-com:vml" Requires="v">
-                    <p:oleObj spid="_x0000_s2316" name="Image" r:id="rId15" imgW="1828440" imgH="1117440" progId="Photoshop.Image.13">
+                    <p:oleObj spid="_x0000_s2380" name="Image" r:id="rId15" imgW="1828440" imgH="1117440" progId="Photoshop.Image.13">
                       <p:embed/>
                     </p:oleObj>
                   </mc:Choice>
@@ -10221,7 +10221,7 @@
               <a:graphicData uri="http://schemas.openxmlformats.org/presentationml/2006/ole">
                 <mc:AlternateContent xmlns:mc="http://schemas.openxmlformats.org/markup-compatibility/2006">
                   <mc:Choice xmlns:v="urn:schemas-microsoft-com:vml" Requires="v">
-                    <p:oleObj spid="_x0000_s2317" name="Image" r:id="rId17" imgW="1828440" imgH="1117440" progId="Photoshop.Image.13">
+                    <p:oleObj spid="_x0000_s2381" name="Image" r:id="rId17" imgW="1828440" imgH="1117440" progId="Photoshop.Image.13">
                       <p:embed/>
                     </p:oleObj>
                   </mc:Choice>
@@ -12007,7 +12007,7 @@
             <a:graphicData uri="http://schemas.openxmlformats.org/presentationml/2006/ole">
               <mc:AlternateContent xmlns:mc="http://schemas.openxmlformats.org/markup-compatibility/2006">
                 <mc:Choice xmlns:v="urn:schemas-microsoft-com:vml" Requires="v">
-                  <p:oleObj spid="_x0000_s3338" name="Image" r:id="rId4" imgW="4571280" imgH="1688760" progId="Photoshop.Image.13">
+                  <p:oleObj spid="_x0000_s3402" name="Image" r:id="rId4" imgW="4571280" imgH="1688760" progId="Photoshop.Image.13">
                     <p:embed/>
                   </p:oleObj>
                 </mc:Choice>
@@ -12091,7 +12091,7 @@
             <a:graphicData uri="http://schemas.openxmlformats.org/presentationml/2006/ole">
               <mc:AlternateContent xmlns:mc="http://schemas.openxmlformats.org/markup-compatibility/2006">
                 <mc:Choice xmlns:v="urn:schemas-microsoft-com:vml" Requires="v">
-                  <p:oleObj spid="_x0000_s3339" name="Image" r:id="rId7" imgW="1574280" imgH="1053720" progId="Photoshop.Image.13">
+                  <p:oleObj spid="_x0000_s3403" name="Image" r:id="rId7" imgW="1574280" imgH="1053720" progId="Photoshop.Image.13">
                     <p:embed/>
                   </p:oleObj>
                 </mc:Choice>
@@ -13600,7 +13600,7 @@
               <a:graphicData uri="http://schemas.openxmlformats.org/presentationml/2006/ole">
                 <mc:AlternateContent xmlns:mc="http://schemas.openxmlformats.org/markup-compatibility/2006">
                   <mc:Choice xmlns:v="urn:schemas-microsoft-com:vml" Requires="v">
-                    <p:oleObj spid="_x0000_s3340" name="Image" r:id="rId15" imgW="1828440" imgH="1117440" progId="Photoshop.Image.13">
+                    <p:oleObj spid="_x0000_s3404" name="Image" r:id="rId15" imgW="1828440" imgH="1117440" progId="Photoshop.Image.13">
                       <p:embed/>
                     </p:oleObj>
                   </mc:Choice>
@@ -13657,7 +13657,7 @@
               <a:graphicData uri="http://schemas.openxmlformats.org/presentationml/2006/ole">
                 <mc:AlternateContent xmlns:mc="http://schemas.openxmlformats.org/markup-compatibility/2006">
                   <mc:Choice xmlns:v="urn:schemas-microsoft-com:vml" Requires="v">
-                    <p:oleObj spid="_x0000_s3341" name="Image" r:id="rId17" imgW="1828440" imgH="1117440" progId="Photoshop.Image.13">
+                    <p:oleObj spid="_x0000_s3405" name="Image" r:id="rId17" imgW="1828440" imgH="1117440" progId="Photoshop.Image.13">
                       <p:embed/>
                     </p:oleObj>
                   </mc:Choice>
@@ -14165,7 +14165,7 @@
           <a:p>
             <a:r>
               <a:rPr lang="en-US" dirty="0"/>
-              <a:t>Data sonification has received some attention in the past, particularly in the 70s as an attempt to create art and more recently as a potential tool in medicine. The most famous of these have used EEG data to create sound, such as Alvin </a:t>
+              <a:t>   Data sonification has received some attention in the past, particularly in the 70s as an attempt to create art and more recently as a potential tool in medicine. The most famous of these have used EEG data to create sound, such as Alvin </a:t>
             </a:r>
             <a:r>
               <a:rPr lang="en-US" dirty="0" err="1"/>
@@ -14337,7 +14337,7 @@
           <a:p>
             <a:r>
               <a:rPr lang="en-US" dirty="0"/>
-              <a:t>   The next step was to apply different statistical methods to the data, the most interesting being the first order differential equation. After doing this to the original sets, I now had three completely new arrays to </a:t>
+              <a:t>   The next step was to apply different statistical methods and mathematical equations to the data, the most interesting being the first order differential equation. After doing this to the original sets, I now had three completely new arrays to </a:t>
             </a:r>
             <a:r>
               <a:rPr lang="en-US" dirty="0" err="1"/>
@@ -14351,7 +14351,7 @@
           <a:p>
             <a:r>
               <a:rPr lang="en-US" dirty="0"/>
-              <a:t>   What we now had at the end of this part of the project were the three normalized and pitch bended data sets, their corresponding and almost percussive difference equation sets, and an event-related percussion track that indicated important moments in the original datasets. At this point, the project is in its second phase: still a ways away from the final destination, but definitely a well-formed structure built on a solid foundation. </a:t>
+              <a:t>   What we now had at the end of this part of the project were the three normalized and pitch bended data sets, their corresponding and almost percussive difference equation sets, and an event-related percussion track that indicated important moments in the original datasets. At this point, the project is in its second phase: still a far from the final destination, but definitely a well-formed structure built on a solid foundation. </a:t>
             </a:r>
           </a:p>
           <a:p>
@@ -14580,15 +14580,7 @@
             </a:r>
             <a:r>
               <a:rPr lang="en-US" dirty="0"/>
-              <a:t> and made them bearable to listen to; I now want to further improve the piece from an aesthetic standpoint and expand the project in terms of the data it </a:t>
-            </a:r>
-            <a:r>
-              <a:rPr lang="en-US" dirty="0" err="1"/>
-              <a:t>processess</a:t>
-            </a:r>
-            <a:r>
-              <a:rPr lang="en-US" dirty="0"/>
-              <a:t>. Ms. Grant, her peers, and I are continuing this project and working together to optimize it for their research; in this case, that means the best musical outcome as well, as the whole purpose of this experiment is to create music that reveals something important about the numbers that created it. Recently we obtained EEG, EGG, EKG, and activity datasets, and these will soon be integrated into the sonification process with concurrent temperature data. Farther down the road, we would like to attempt mapping this data in real-time, with a human wearing sensors, without having to translate to MIDI first. This step, should it come to fruition, would make the piece truly generative (the composer would really only be adjusting equations and choosing parameters), and could also be a more responsive tool for investigating the human body. Possible uses of technology like this outside of research would be as a medical monitoring tool, either for laymen interested in their own health, or for medical professionals who often find their visual faculties occupied and would benefit from a device that can output data aurally.</a:t>
+              <a:t> and made them bearable to listen to; I now want to further improve the piece from an aesthetic standpoint and expand the project to include additional circadian rhythms. Ms. Grant, her peers, and I are continuing this project and working together to optimize it for their research; in this case, that means the best musical outcome as well, as the whole purpose of this experiment is to create music that reveals something important about the numbers that created it. Recently we obtained EEG, EGG, EKG, and activity datasets, and these will soon be integrated into the sonification process with concurrent temperature data. Farther down the road, we would like to attempt mapping this data in real-time, with a human wearing sensors, without having to translate to MIDI first. This step, should it come to fruition, would make the piece truly generative (the composer would really only be adjusting equations and choosing parameters), and could also be a more responsive tool for investigating the human body. Possible uses of technology like this outside of research would be as a medical monitoring tool, either for laymen interested in their own health, or for medical professionals who often find their visual faculties occupied and would benefit from a device that can output data aurally.</a:t>
             </a:r>
           </a:p>
           <a:p>
@@ -14737,15 +14729,7 @@
             </a:r>
             <a:r>
               <a:rPr lang="en-US" i="1" dirty="0"/>
-              <a:t>Biofeedback and the arts: results of </a:t>
-            </a:r>
-            <a:r>
-              <a:rPr lang="en-US" i="1" dirty="0" err="1"/>
-              <a:t>arly</a:t>
-            </a:r>
-            <a:r>
-              <a:rPr lang="en-US" i="1" dirty="0"/>
-              <a:t> experiments</a:t>
+              <a:t>Biofeedback and the arts: results of early experiments</a:t>
             </a:r>
             <a:r>
               <a:rPr lang="en-US" dirty="0"/>
@@ -14874,7 +14858,7 @@
           <a:p>
             <a:r>
               <a:rPr lang="en-US" dirty="0"/>
-              <a:t>-Immediate Objective: Discover what statistical methods are worth taking and </a:t>
+              <a:t>-Immediate Objective: Discover which analytical methods are worth taking and </a:t>
             </a:r>
             <a:r>
               <a:rPr lang="en-US" dirty="0" err="1"/>
@@ -15828,7 +15812,7 @@
         <p:spPr>
           <a:xfrm>
             <a:off x="22222950" y="19886230"/>
-            <a:ext cx="10048874" cy="11772431"/>
+            <a:ext cx="10048874" cy="13003538"/>
           </a:xfrm>
           <a:prstGeom prst="rect">
             <a:avLst/>
@@ -15986,7 +15970,15 @@
           <a:p>
             <a:r>
               <a:rPr lang="en-US" dirty="0"/>
-              <a:t>   The statistics taken on the data began to hint at deeper meanings. Covariance and correlation confirmed the obvious, which was that the distal and axial sets were positively correlated, and both inversely correlated with the core dataset. This has not been really helpful yet, although it might be in the future. What was more interesting was creating new arrays from the existing sets using first-order differential calculus; doing this for all datasets, I now had three completely new arrays to </a:t>
+              <a:t>   Analyzing the data mathematically and </a:t>
+            </a:r>
+            <a:r>
+              <a:rPr lang="en-US" dirty="0" err="1"/>
+              <a:t>sonifying</a:t>
+            </a:r>
+            <a:r>
+              <a:rPr lang="en-US" dirty="0"/>
+              <a:t> function outputs proved to yield the most interesting sounds. Covariance and correlation confirmed the obvious, which was that the distal and axial sets were positively correlated, and both inversely correlated with the core dataset. What was more interesting was creating new arrays from the existing sets using first-order differential calculus; doing this for all datasets, I now had three completely new arrays to </a:t>
             </a:r>
             <a:r>
               <a:rPr lang="en-US" dirty="0" err="1"/>
@@ -15994,7 +15986,7 @@
             </a:r>
             <a:r>
               <a:rPr lang="en-US" dirty="0"/>
-              <a:t>. Leaving out values of zero (indicating no change from one sample to the next), what could be heard was a meaningful accompaniment to the data that could communicate movement of the data. In fact, with the original dataset MIDI turned off, the difference equation MIDI could accurately convey a sense of the data, although now the piece was pointillistic rather than three streams of sound, which sounds like a more efficient and clear way of perceiving the data. Using the next orders of calculus, this concept could be taken further to reveal things like local minima and maxima, although that step has not yet been taken. What I did do was add the overall maxima and minima for each individual dataset to a percussion track, indicating very clearly while listening the points in the recording where we reached a meaningful peak or valley in temperature. </a:t>
+              <a:t>. Leaving out values of zero (indicating no change from one sample to the next), what could be heard was a meaningful accompaniment to the data that could communicate movement of the data. In fact, with the original dataset MIDI turned off, the difference equation MIDI could accurately convey a sense of the data, although now the piece was pointillistic rather than three streams of sound, which proved a more efficient and clear way of perceiving the data. Using the second order derivative, this concept could be taken further to reveal things like local minima and maxima. Adding the global maxima and minima for each individual dataset to a percussion track clearly indicated while listening the points in the recording where we reached a  peak or valley in temperature. The recordings were successfully communicating meaningful information about the data, and we were understanding it intuitively. Ultimately, we were experiencing how useful it was to listen to the data in this way. </a:t>
             </a:r>
           </a:p>
           <a:p>

</xml_diff>